<commit_message>
Powerpoint wasn't saved before
</commit_message>
<xml_diff>
--- a/Git/2020_06_16 Intro to Git Handout.pptx
+++ b/Git/2020_06_16 Intro to Git Handout.pptx
@@ -262,6 +262,11 @@
       </a:defRPr>
     </a:lvl9pPr>
   </p:defaultTextStyle>
+  <p:extLst>
+    <p:ext uri="{EFAFB233-063F-42B5-8137-9DF3F51BA10A}">
+      <p15:sldGuideLst xmlns:p15="http://schemas.microsoft.com/office/powerpoint/2012/main"/>
+    </p:ext>
+  </p:extLst>
 </p:presentation>
 </file>
 
@@ -1151,7 +1156,7 @@
         </p:nvSpPr>
         <p:spPr>
           <a:xfrm>
-            <a:off x="381300" y="685800"/>
+            <a:off x="381000" y="685800"/>
             <a:ext cx="6096000" cy="3429000"/>
           </a:xfrm>
           <a:custGeom>
@@ -8298,7 +8303,7 @@
               <a:buNone/>
             </a:pPr>
             <a:r>
-              <a:rPr lang="en-GB" u="sng">
+              <a:rPr lang="en-GB" u="sng" dirty="0">
                 <a:solidFill>
                   <a:schemeClr val="hlink"/>
                 </a:solidFill>
@@ -8306,7 +8311,7 @@
               </a:rPr>
               <a:t>Git Cheat Sheet</a:t>
             </a:r>
-            <a:endParaRPr/>
+            <a:endParaRPr dirty="0"/>
           </a:p>
           <a:p>
             <a:pPr marL="0" lvl="0" indent="0" algn="l" rtl="0">
@@ -8319,7 +8324,7 @@
               <a:buNone/>
             </a:pPr>
             <a:r>
-              <a:rPr lang="en-GB" u="sng">
+              <a:rPr lang="en-GB" u="sng" dirty="0">
                 <a:solidFill>
                   <a:schemeClr val="hlink"/>
                 </a:solidFill>
@@ -8327,7 +8332,7 @@
               </a:rPr>
               <a:t>Pro Git (THE Git Book) - Free</a:t>
             </a:r>
-            <a:endParaRPr/>
+            <a:endParaRPr dirty="0"/>
           </a:p>
           <a:p>
             <a:pPr marL="0" lvl="0" indent="0" algn="l" rtl="0">
@@ -8340,15 +8345,33 @@
               <a:buNone/>
             </a:pPr>
             <a:r>
-              <a:rPr lang="en-GB" u="sng">
+              <a:rPr lang="en-GB" u="sng" dirty="0">
                 <a:solidFill>
                   <a:schemeClr val="hlink"/>
                 </a:solidFill>
                 <a:hlinkClick r:id="rId5"/>
               </a:rPr>
-              <a:t>CRUK intro to Github Workshop</a:t>
-            </a:r>
-            <a:endParaRPr/>
+              <a:t>CRUK intro to </a:t>
+            </a:r>
+            <a:r>
+              <a:rPr lang="en-GB" u="sng" dirty="0" err="1">
+                <a:solidFill>
+                  <a:schemeClr val="hlink"/>
+                </a:solidFill>
+                <a:hlinkClick r:id="rId5"/>
+              </a:rPr>
+              <a:t>Github</a:t>
+            </a:r>
+            <a:r>
+              <a:rPr lang="en-GB" u="sng" dirty="0">
+                <a:solidFill>
+                  <a:schemeClr val="hlink"/>
+                </a:solidFill>
+                <a:hlinkClick r:id="rId5"/>
+              </a:rPr>
+              <a:t> Workshop</a:t>
+            </a:r>
+            <a:endParaRPr dirty="0"/>
           </a:p>
           <a:p>
             <a:pPr marL="0" lvl="0" indent="0" algn="l" rtl="0">
@@ -8361,15 +8384,24 @@
               <a:buNone/>
             </a:pPr>
             <a:r>
-              <a:rPr lang="en-GB" u="sng">
+              <a:rPr lang="en-GB" u="sng" dirty="0" err="1">
                 <a:solidFill>
                   <a:schemeClr val="hlink"/>
                 </a:solidFill>
                 <a:hlinkClick r:id="rId6"/>
               </a:rPr>
-              <a:t>Github 15 Min Intro to Git</a:t>
-            </a:r>
-            <a:endParaRPr/>
+              <a:t>Github</a:t>
+            </a:r>
+            <a:r>
+              <a:rPr lang="en-GB" u="sng" dirty="0">
+                <a:solidFill>
+                  <a:schemeClr val="hlink"/>
+                </a:solidFill>
+                <a:hlinkClick r:id="rId6"/>
+              </a:rPr>
+              <a:t> Reading and Practice</a:t>
+            </a:r>
+            <a:endParaRPr dirty="0"/>
           </a:p>
           <a:p>
             <a:pPr marL="0" lvl="0" indent="0" algn="l" rtl="0">
@@ -8382,7 +8414,7 @@
               <a:buNone/>
             </a:pPr>
             <a:r>
-              <a:rPr lang="en-GB" u="sng">
+              <a:rPr lang="en-GB" u="sng" dirty="0">
                 <a:solidFill>
                   <a:schemeClr val="hlink"/>
                 </a:solidFill>
@@ -8390,7 +8422,7 @@
               </a:rPr>
               <a:t>Code Academy Git Course (~2hr)</a:t>
             </a:r>
-            <a:endParaRPr/>
+            <a:endParaRPr dirty="0"/>
           </a:p>
           <a:p>
             <a:pPr marL="0" lvl="0" indent="0" algn="l" rtl="0">
@@ -8403,7 +8435,7 @@
               <a:buNone/>
             </a:pPr>
             <a:r>
-              <a:rPr lang="en-GB" u="sng">
+              <a:rPr lang="en-GB" u="sng" dirty="0">
                 <a:solidFill>
                   <a:schemeClr val="hlink"/>
                 </a:solidFill>
@@ -8411,7 +8443,7 @@
               </a:rPr>
               <a:t>UIS Day Course in Git (free)</a:t>
             </a:r>
-            <a:endParaRPr/>
+            <a:endParaRPr dirty="0"/>
           </a:p>
           <a:p>
             <a:pPr marL="0" lvl="0" indent="0" algn="l" rtl="0">
@@ -8424,15 +8456,24 @@
               <a:buNone/>
             </a:pPr>
             <a:r>
-              <a:rPr lang="en-GB" u="sng">
+              <a:rPr lang="en-GB" u="sng" dirty="0" err="1">
                 <a:solidFill>
                   <a:schemeClr val="hlink"/>
                 </a:solidFill>
                 <a:hlinkClick r:id="rId9"/>
               </a:rPr>
-              <a:t>Github Education Pack (Free)</a:t>
-            </a:r>
-            <a:endParaRPr/>
+              <a:t>Github</a:t>
+            </a:r>
+            <a:r>
+              <a:rPr lang="en-GB" u="sng" dirty="0">
+                <a:solidFill>
+                  <a:schemeClr val="hlink"/>
+                </a:solidFill>
+                <a:hlinkClick r:id="rId9"/>
+              </a:rPr>
+              <a:t> Education Pack (Free)</a:t>
+            </a:r>
+            <a:endParaRPr dirty="0"/>
           </a:p>
           <a:p>
             <a:pPr marL="0" lvl="0" indent="0" algn="l" rtl="0">
@@ -8445,7 +8486,7 @@
               <a:buNone/>
             </a:pPr>
             <a:r>
-              <a:rPr lang="en-GB" u="sng">
+              <a:rPr lang="en-GB" u="sng" dirty="0">
                 <a:solidFill>
                   <a:schemeClr val="hlink"/>
                 </a:solidFill>
@@ -8453,7 +8494,7 @@
               </a:rPr>
               <a:t>Learn Git Branching (More Advanced)</a:t>
             </a:r>
-            <a:endParaRPr/>
+            <a:endParaRPr dirty="0"/>
           </a:p>
           <a:p>
             <a:pPr marL="0" lvl="0" indent="0" algn="l" rtl="0">
@@ -8465,7 +8506,7 @@
               </a:spcAft>
               <a:buNone/>
             </a:pPr>
-            <a:endParaRPr/>
+            <a:endParaRPr dirty="0"/>
           </a:p>
         </p:txBody>
       </p:sp>

</xml_diff>